<commit_message>
Updated PPT a bit
</commit_message>
<xml_diff>
--- a/fire-app/fireppt/Fire Extinguisher Robot.pptx
+++ b/fire-app/fireppt/Fire Extinguisher Robot.pptx
@@ -2273,7 +2273,7 @@
             <a:fld id="{B61BEF0D-F0BB-DE4B-95CE-6DB70DBA9567}" type="datetimeFigureOut">
               <a:rPr lang="en-US" dirty="0"/>
               <a:pPr/>
-              <a:t>3/3/2024</a:t>
+              <a:t>4/13/2024</a:t>
             </a:fld>
             <a:endParaRPr lang="en-US" dirty="0"/>
           </a:p>
@@ -2535,7 +2535,7 @@
             <a:fld id="{B61BEF0D-F0BB-DE4B-95CE-6DB70DBA9567}" type="datetimeFigureOut">
               <a:rPr lang="en-US" dirty="0"/>
               <a:pPr/>
-              <a:t>3/3/2024</a:t>
+              <a:t>4/13/2024</a:t>
             </a:fld>
             <a:endParaRPr lang="en-US" dirty="0"/>
           </a:p>
@@ -2860,7 +2860,7 @@
             <a:fld id="{B61BEF0D-F0BB-DE4B-95CE-6DB70DBA9567}" type="datetimeFigureOut">
               <a:rPr lang="en-US" dirty="0"/>
               <a:pPr/>
-              <a:t>3/3/2024</a:t>
+              <a:t>4/13/2024</a:t>
             </a:fld>
             <a:endParaRPr lang="en-US" dirty="0"/>
           </a:p>
@@ -3212,7 +3212,7 @@
             <a:fld id="{B61BEF0D-F0BB-DE4B-95CE-6DB70DBA9567}" type="datetimeFigureOut">
               <a:rPr lang="en-US" dirty="0"/>
               <a:pPr/>
-              <a:t>3/3/2024</a:t>
+              <a:t>4/13/2024</a:t>
             </a:fld>
             <a:endParaRPr lang="en-US" dirty="0"/>
           </a:p>
@@ -3537,7 +3537,7 @@
             <a:fld id="{B61BEF0D-F0BB-DE4B-95CE-6DB70DBA9567}" type="datetimeFigureOut">
               <a:rPr lang="en-US" dirty="0"/>
               <a:pPr/>
-              <a:t>3/3/2024</a:t>
+              <a:t>4/13/2024</a:t>
             </a:fld>
             <a:endParaRPr lang="en-US" dirty="0"/>
           </a:p>
@@ -3941,7 +3941,7 @@
             <a:fld id="{B61BEF0D-F0BB-DE4B-95CE-6DB70DBA9567}" type="datetimeFigureOut">
               <a:rPr lang="en-US" dirty="0"/>
               <a:pPr/>
-              <a:t>3/3/2024</a:t>
+              <a:t>4/13/2024</a:t>
             </a:fld>
             <a:endParaRPr lang="en-US" dirty="0"/>
           </a:p>
@@ -4121,7 +4121,7 @@
           <a:p>
             <a:fld id="{55C6B4A9-1611-4792-9094-5F34BCA07E0B}" type="datetimeFigureOut">
               <a:rPr lang="en-US" dirty="0"/>
-              <a:t>3/3/2024</a:t>
+              <a:t>4/13/2024</a:t>
             </a:fld>
             <a:endParaRPr lang="en-US" dirty="0"/>
           </a:p>
@@ -4312,7 +4312,7 @@
             <a:fld id="{B61BEF0D-F0BB-DE4B-95CE-6DB70DBA9567}" type="datetimeFigureOut">
               <a:rPr lang="en-US" dirty="0"/>
               <a:pPr/>
-              <a:t>3/3/2024</a:t>
+              <a:t>4/13/2024</a:t>
             </a:fld>
             <a:endParaRPr lang="en-US" dirty="0"/>
           </a:p>
@@ -5874,7 +5874,7 @@
             <a:fld id="{B61BEF0D-F0BB-DE4B-95CE-6DB70DBA9567}" type="datetimeFigureOut">
               <a:rPr lang="en-US" dirty="0"/>
               <a:pPr/>
-              <a:t>3/3/2024</a:t>
+              <a:t>4/13/2024</a:t>
             </a:fld>
             <a:endParaRPr lang="en-US" dirty="0"/>
           </a:p>
@@ -6499,7 +6499,7 @@
             <a:fld id="{B61BEF0D-F0BB-DE4B-95CE-6DB70DBA9567}" type="datetimeFigureOut">
               <a:rPr lang="en-US" dirty="0"/>
               <a:pPr/>
-              <a:t>3/3/2024</a:t>
+              <a:t>4/13/2024</a:t>
             </a:fld>
             <a:endParaRPr lang="en-US" dirty="0"/>
           </a:p>
@@ -6741,7 +6741,7 @@
           <a:p>
             <a:fld id="{EB712588-04B1-427B-82EE-E8DB90309F08}" type="datetimeFigureOut">
               <a:rPr lang="en-US" dirty="0"/>
-              <a:t>3/3/2024</a:t>
+              <a:t>4/13/2024</a:t>
             </a:fld>
             <a:endParaRPr lang="en-US" dirty="0"/>
           </a:p>
@@ -7126,7 +7126,7 @@
             <a:fld id="{B61BEF0D-F0BB-DE4B-95CE-6DB70DBA9567}" type="datetimeFigureOut">
               <a:rPr lang="en-US" dirty="0"/>
               <a:pPr/>
-              <a:t>3/3/2024</a:t>
+              <a:t>4/13/2024</a:t>
             </a:fld>
             <a:endParaRPr lang="en-US" dirty="0"/>
           </a:p>
@@ -7260,7 +7260,7 @@
             <a:fld id="{B61BEF0D-F0BB-DE4B-95CE-6DB70DBA9567}" type="datetimeFigureOut">
               <a:rPr lang="en-US" dirty="0"/>
               <a:pPr/>
-              <a:t>3/3/2024</a:t>
+              <a:t>4/13/2024</a:t>
             </a:fld>
             <a:endParaRPr lang="en-US" dirty="0"/>
           </a:p>
@@ -7366,7 +7366,7 @@
             <a:fld id="{B61BEF0D-F0BB-DE4B-95CE-6DB70DBA9567}" type="datetimeFigureOut">
               <a:rPr lang="en-US" dirty="0"/>
               <a:pPr/>
-              <a:t>3/3/2024</a:t>
+              <a:t>4/13/2024</a:t>
             </a:fld>
             <a:endParaRPr lang="en-US" dirty="0"/>
           </a:p>
@@ -7630,7 +7630,7 @@
           <a:p>
             <a:fld id="{42A54C80-263E-416B-A8E0-580EDEADCBDC}" type="datetimeFigureOut">
               <a:rPr lang="en-US" dirty="0"/>
-              <a:t>3/3/2024</a:t>
+              <a:t>4/13/2024</a:t>
             </a:fld>
             <a:endParaRPr lang="en-US" dirty="0"/>
           </a:p>
@@ -7904,7 +7904,7 @@
             <a:fld id="{B61BEF0D-F0BB-DE4B-95CE-6DB70DBA9567}" type="datetimeFigureOut">
               <a:rPr lang="en-US" dirty="0"/>
               <a:pPr/>
-              <a:t>3/3/2024</a:t>
+              <a:t>4/13/2024</a:t>
             </a:fld>
             <a:endParaRPr lang="en-US" dirty="0"/>
           </a:p>
@@ -8658,7 +8658,7 @@
             <a:fld id="{B61BEF0D-F0BB-DE4B-95CE-6DB70DBA9567}" type="datetimeFigureOut">
               <a:rPr lang="en-US" dirty="0"/>
               <a:pPr/>
-              <a:t>3/3/2024</a:t>
+              <a:t>4/13/2024</a:t>
             </a:fld>
             <a:endParaRPr lang="en-US" dirty="0"/>
           </a:p>
@@ -9262,8 +9262,8 @@
         </p:nvSpPr>
         <p:spPr>
           <a:xfrm>
-            <a:off x="183247" y="3579639"/>
-            <a:ext cx="8118600" cy="1563861"/>
+            <a:off x="183247" y="3453618"/>
+            <a:ext cx="8118600" cy="1675814"/>
           </a:xfrm>
           <a:prstGeom prst="rect">
             <a:avLst/>
@@ -9318,7 +9318,7 @@
             </a:pPr>
             <a:r>
               <a:rPr lang="en" sz="1700" dirty="0"/>
-              <a:t>Manoj</a:t>
+              <a:t>Suman Majee</a:t>
             </a:r>
             <a:endParaRPr sz="1700" dirty="0"/>
           </a:p>
@@ -9351,6 +9351,21 @@
             <a:r>
               <a:rPr lang="en" sz="1700" dirty="0"/>
               <a:t>Aishik Paul</a:t>
+            </a:r>
+          </a:p>
+          <a:p>
+            <a:pPr marL="0" lvl="0" indent="0" algn="l" rtl="0">
+              <a:spcBef>
+                <a:spcPts val="0"/>
+              </a:spcBef>
+              <a:spcAft>
+                <a:spcPts val="0"/>
+              </a:spcAft>
+              <a:buNone/>
+            </a:pPr>
+            <a:r>
+              <a:rPr lang="en-IN" sz="1700" dirty="0"/>
+              <a:t>Trisha Sengupta</a:t>
             </a:r>
             <a:endParaRPr sz="1700" dirty="0"/>
           </a:p>
@@ -13649,44 +13664,22 @@
               <a:buNone/>
             </a:pPr>
             <a:r>
-              <a:rPr lang="en"/>
+              <a:rPr lang="en" dirty="0">
+                <a:solidFill>
+                  <a:schemeClr val="bg2">
+                    <a:lumMod val="50000"/>
+                  </a:schemeClr>
+                </a:solidFill>
+              </a:rPr>
               <a:t>Equipments</a:t>
             </a:r>
-            <a:endParaRPr/>
-          </a:p>
-        </p:txBody>
-      </p:sp>
-      <p:sp>
-        <p:nvSpPr>
-          <p:cNvPr id="89" name="Google Shape;89;p18"/>
-          <p:cNvSpPr txBox="1">
-            <a:spLocks noGrp="1"/>
-          </p:cNvSpPr>
-          <p:nvPr>
-            <p:ph type="subTitle" idx="1"/>
-          </p:nvPr>
-        </p:nvSpPr>
-        <p:spPr>
-          <a:prstGeom prst="rect">
-            <a:avLst/>
-          </a:prstGeom>
-        </p:spPr>
-        <p:txBody>
-          <a:bodyPr spcFirstLastPara="1" wrap="square" lIns="91425" tIns="91425" rIns="91425" bIns="91425" anchor="t" anchorCtr="0">
-            <a:noAutofit/>
-          </a:bodyPr>
-          <a:lstStyle/>
-          <a:p>
-            <a:pPr marL="0" lvl="0" indent="0" algn="ctr" rtl="0">
-              <a:spcBef>
-                <a:spcPts val="0"/>
-              </a:spcBef>
-              <a:spcAft>
-                <a:spcPts val="0"/>
-              </a:spcAft>
-              <a:buNone/>
-            </a:pPr>
-            <a:endParaRPr dirty="0"/>
+            <a:endParaRPr dirty="0">
+              <a:solidFill>
+                <a:schemeClr val="bg2">
+                  <a:lumMod val="50000"/>
+                </a:schemeClr>
+              </a:solidFill>
+            </a:endParaRPr>
           </a:p>
         </p:txBody>
       </p:sp>

</xml_diff>